<commit_message>
math ramp update, bio125 update
</commit_message>
<xml_diff>
--- a/2014SpBio125,researchday,DPCC/bio125_2014Spring20140304.pptx
+++ b/2014SpBio125,researchday,DPCC/bio125_2014Spring20140304.pptx
@@ -147,24 +147,6 @@
 </p:cmAuthorLst>
 </file>
 
-<file path=ppt/comments/comment1.xml><?xml version="1.0" encoding="utf-8"?>
-<p:cmLst xmlns:a="http://schemas.openxmlformats.org/drawingml/2006/main" xmlns:r="http://schemas.openxmlformats.org/officeDocument/2006/relationships" xmlns:p="http://schemas.openxmlformats.org/presentationml/2006/main">
-  <p:cm authorId="0" dt="2013-04-16T13:55:06.049" idx="2">
-    <p:pos x="10" y="10"/>
-    <p:text/>
-  </p:cm>
-</p:cmLst>
-</file>
-
-<file path=ppt/comments/comment2.xml><?xml version="1.0" encoding="utf-8"?>
-<p:cmLst xmlns:a="http://schemas.openxmlformats.org/drawingml/2006/main" xmlns:r="http://schemas.openxmlformats.org/officeDocument/2006/relationships" xmlns:p="http://schemas.openxmlformats.org/presentationml/2006/main">
-  <p:cm authorId="0" dt="2013-04-16T13:55:06.049" idx="3">
-    <p:pos x="10" y="10"/>
-    <p:text/>
-  </p:cm>
-</p:cmLst>
-</file>
-
 <file path=ppt/notesMasters/notesMaster1.xml><?xml version="1.0" encoding="utf-8"?>
 <p:notesMaster xmlns:a="http://schemas.openxmlformats.org/drawingml/2006/main" xmlns:r="http://schemas.openxmlformats.org/officeDocument/2006/relationships" xmlns:p="http://schemas.openxmlformats.org/presentationml/2006/main">
   <p:cSld>
@@ -256,7 +238,7 @@
             <a:fld id="{20089B8C-FF37-ED46-B3FC-4062649AF89E}" type="datetime1">
               <a:rPr lang="en-US"/>
               <a:pPr/>
-              <a:t>4/6/2014</a:t>
+              <a:t>4/7/14</a:t>
             </a:fld>
             <a:endParaRPr lang="en-US"/>
           </a:p>
@@ -5307,7 +5289,7 @@
             <a:noFill/>
           </a:ln>
           <a:extLst>
-            <a:ext uri="{53640926-AAD7-44D8-BBD7-CCE9431645EC}">
+            <a:ext uri="{53640926-AAD7-44d8-BBD7-CCE9431645EC}">
               <a14:shadowObscured xmlns:a14="http://schemas.microsoft.com/office/drawing/2010/main"/>
             </a:ext>
           </a:extLst>
@@ -5449,14 +5431,14 @@
           </a:ln>
           <a:effectLst/>
           <a:extLst>
-            <a:ext uri="{909E8E84-426E-40DD-AFC4-6F175D3DCCD1}">
+            <a:ext uri="{909E8E84-426E-40dd-AFC4-6F175D3DCCD1}">
               <a14:hiddenFill xmlns:a14="http://schemas.microsoft.com/office/drawing/2010/main">
                 <a:solidFill>
                   <a:schemeClr val="accent1"/>
                 </a:solidFill>
               </a14:hiddenFill>
             </a:ext>
-            <a:ext uri="{91240B29-F687-4F45-9708-019B960494DF}">
+            <a:ext uri="{91240B29-F687-4f45-9708-019B960494DF}">
               <a14:hiddenLine xmlns:a14="http://schemas.microsoft.com/office/drawing/2010/main" w="9525">
                 <a:solidFill>
                   <a:schemeClr val="tx1"/>
@@ -5466,7 +5448,7 @@
                 <a:tailEnd/>
               </a14:hiddenLine>
             </a:ext>
-            <a:ext uri="{AF507438-7753-43E0-B8FC-AC1667EBCBE1}">
+            <a:ext uri="{AF507438-7753-43e0-B8FC-AC1667EBCBE1}">
               <a14:hiddenEffects xmlns:a14="http://schemas.microsoft.com/office/drawing/2010/main">
                 <a:effectLst>
                   <a:outerShdw dist="35921" dir="2700000" algn="ctr" rotWithShape="0">
@@ -5543,14 +5525,14 @@
           </a:ln>
           <a:effectLst/>
           <a:extLst>
-            <a:ext uri="{909E8E84-426E-40DD-AFC4-6F175D3DCCD1}">
+            <a:ext uri="{909E8E84-426E-40dd-AFC4-6F175D3DCCD1}">
               <a14:hiddenFill xmlns:a14="http://schemas.microsoft.com/office/drawing/2010/main">
                 <a:solidFill>
                   <a:schemeClr val="accent1"/>
                 </a:solidFill>
               </a14:hiddenFill>
             </a:ext>
-            <a:ext uri="{91240B29-F687-4F45-9708-019B960494DF}">
+            <a:ext uri="{91240B29-F687-4f45-9708-019B960494DF}">
               <a14:hiddenLine xmlns:a14="http://schemas.microsoft.com/office/drawing/2010/main" w="9525">
                 <a:solidFill>
                   <a:schemeClr val="tx1"/>
@@ -5560,7 +5542,7 @@
                 <a:tailEnd/>
               </a14:hiddenLine>
             </a:ext>
-            <a:ext uri="{AF507438-7753-43E0-B8FC-AC1667EBCBE1}">
+            <a:ext uri="{AF507438-7753-43e0-B8FC-AC1667EBCBE1}">
               <a14:hiddenEffects xmlns:a14="http://schemas.microsoft.com/office/drawing/2010/main">
                 <a:effectLst>
                   <a:outerShdw dist="35921" dir="2700000" algn="ctr" rotWithShape="0">
@@ -5763,14 +5745,14 @@
           </a:ln>
           <a:effectLst/>
           <a:extLst>
-            <a:ext uri="{909E8E84-426E-40DD-AFC4-6F175D3DCCD1}">
+            <a:ext uri="{909E8E84-426E-40dd-AFC4-6F175D3DCCD1}">
               <a14:hiddenFill xmlns:a14="http://schemas.microsoft.com/office/drawing/2010/main">
                 <a:solidFill>
                   <a:schemeClr val="accent1"/>
                 </a:solidFill>
               </a14:hiddenFill>
             </a:ext>
-            <a:ext uri="{91240B29-F687-4F45-9708-019B960494DF}">
+            <a:ext uri="{91240B29-F687-4f45-9708-019B960494DF}">
               <a14:hiddenLine xmlns:a14="http://schemas.microsoft.com/office/drawing/2010/main" w="9525">
                 <a:solidFill>
                   <a:schemeClr val="tx1"/>
@@ -5780,7 +5762,7 @@
                 <a:tailEnd/>
               </a14:hiddenLine>
             </a:ext>
-            <a:ext uri="{AF507438-7753-43E0-B8FC-AC1667EBCBE1}">
+            <a:ext uri="{AF507438-7753-43e0-B8FC-AC1667EBCBE1}">
               <a14:hiddenEffects xmlns:a14="http://schemas.microsoft.com/office/drawing/2010/main">
                 <a:effectLst>
                   <a:outerShdw dist="35921" dir="2700000" algn="ctr" rotWithShape="0">
@@ -5821,7 +5803,7 @@
             <a:noFill/>
           </a:ln>
           <a:extLst>
-            <a:ext uri="{53640926-AAD7-44D8-BBD7-CCE9431645EC}">
+            <a:ext uri="{53640926-AAD7-44d8-BBD7-CCE9431645EC}">
               <a14:shadowObscured xmlns:a14="http://schemas.microsoft.com/office/drawing/2010/main"/>
             </a:ext>
           </a:extLst>
@@ -9834,7 +9816,7 @@
   <p:timing>
     <p:tnLst>
       <p:par>
-        <p:cTn id="1" dur="indefinite" restart="never" nodeType="tmRoot">
+        <p:cTn xmlns:p14="http://schemas.microsoft.com/office/powerpoint/2010/main" id="1" dur="indefinite" restart="never" nodeType="tmRoot">
           <p:childTnLst>
             <p:seq concurrent="1" nextAc="seek">
               <p:cTn id="2" dur="indefinite" nodeType="mainSeq">
@@ -11995,14 +11977,14 @@
           </a:ln>
           <a:effectLst/>
           <a:extLst>
-            <a:ext uri="{909E8E84-426E-40DD-AFC4-6F175D3DCCD1}">
+            <a:ext uri="{909E8E84-426E-40dd-AFC4-6F175D3DCCD1}">
               <a14:hiddenFill xmlns:a14="http://schemas.microsoft.com/office/drawing/2010/main">
                 <a:solidFill>
                   <a:schemeClr val="accent1"/>
                 </a:solidFill>
               </a14:hiddenFill>
             </a:ext>
-            <a:ext uri="{91240B29-F687-4F45-9708-019B960494DF}">
+            <a:ext uri="{91240B29-F687-4f45-9708-019B960494DF}">
               <a14:hiddenLine xmlns:a14="http://schemas.microsoft.com/office/drawing/2010/main" w="9525">
                 <a:solidFill>
                   <a:schemeClr val="tx1"/>
@@ -12012,7 +11994,7 @@
                 <a:tailEnd/>
               </a14:hiddenLine>
             </a:ext>
-            <a:ext uri="{AF507438-7753-43E0-B8FC-AC1667EBCBE1}">
+            <a:ext uri="{AF507438-7753-43e0-B8FC-AC1667EBCBE1}">
               <a14:hiddenEffects xmlns:a14="http://schemas.microsoft.com/office/drawing/2010/main">
                 <a:effectLst>
                   <a:outerShdw dist="35921" dir="2700000" algn="ctr" rotWithShape="0">
@@ -12047,7 +12029,7 @@
             <a:noFill/>
           </a:ln>
           <a:extLst>
-            <a:ext uri="{53640926-AAD7-44D8-BBD7-CCE9431645EC}">
+            <a:ext uri="{53640926-AAD7-44d8-BBD7-CCE9431645EC}">
               <a14:shadowObscured xmlns:a14="http://schemas.microsoft.com/office/drawing/2010/main"/>
             </a:ext>
           </a:extLst>
@@ -12109,7 +12091,7 @@
             <a:noFill/>
           </a:ln>
           <a:extLst>
-            <a:ext uri="{53640926-AAD7-44D8-BBD7-CCE9431645EC}">
+            <a:ext uri="{53640926-AAD7-44d8-BBD7-CCE9431645EC}">
               <a14:shadowObscured xmlns:a14="http://schemas.microsoft.com/office/drawing/2010/main"/>
             </a:ext>
           </a:extLst>
@@ -12138,7 +12120,7 @@
             <a:noFill/>
           </a:ln>
           <a:extLst>
-            <a:ext uri="{53640926-AAD7-44D8-BBD7-CCE9431645EC}">
+            <a:ext uri="{53640926-AAD7-44d8-BBD7-CCE9431645EC}">
               <a14:shadowObscured xmlns:a14="http://schemas.microsoft.com/office/drawing/2010/main"/>
             </a:ext>
           </a:extLst>
@@ -12179,14 +12161,14 @@
           </a:ln>
           <a:effectLst/>
           <a:extLst>
-            <a:ext uri="{909E8E84-426E-40DD-AFC4-6F175D3DCCD1}">
+            <a:ext uri="{909E8E84-426E-40dd-AFC4-6F175D3DCCD1}">
               <a14:hiddenFill xmlns:a14="http://schemas.microsoft.com/office/drawing/2010/main">
                 <a:solidFill>
                   <a:schemeClr val="accent1"/>
                 </a:solidFill>
               </a14:hiddenFill>
             </a:ext>
-            <a:ext uri="{91240B29-F687-4F45-9708-019B960494DF}">
+            <a:ext uri="{91240B29-F687-4f45-9708-019B960494DF}">
               <a14:hiddenLine xmlns:a14="http://schemas.microsoft.com/office/drawing/2010/main" w="9525">
                 <a:solidFill>
                   <a:schemeClr val="tx1"/>
@@ -12196,7 +12178,7 @@
                 <a:tailEnd/>
               </a14:hiddenLine>
             </a:ext>
-            <a:ext uri="{AF507438-7753-43E0-B8FC-AC1667EBCBE1}">
+            <a:ext uri="{AF507438-7753-43e0-B8FC-AC1667EBCBE1}">
               <a14:hiddenEffects xmlns:a14="http://schemas.microsoft.com/office/drawing/2010/main">
                 <a:effectLst>
                   <a:outerShdw dist="35921" dir="2700000" algn="ctr" rotWithShape="0">
@@ -12257,7 +12239,7 @@
   <p:timing>
     <p:tnLst>
       <p:par>
-        <p:cTn id="1" dur="indefinite" restart="never" nodeType="tmRoot">
+        <p:cTn xmlns:p14="http://schemas.microsoft.com/office/powerpoint/2010/main" id="1" dur="indefinite" restart="never" nodeType="tmRoot">
           <p:childTnLst>
             <p:seq concurrent="1" nextAc="seek">
               <p:cTn id="2" dur="indefinite" nodeType="mainSeq">

</xml_diff>